<commit_message>
modified Design Review with all changes suggested by sabetto
</commit_message>
<xml_diff>
--- a/Assignments/E04 - Draft Design Review.pptx
+++ b/Assignments/E04 - Draft Design Review.pptx
@@ -126,6 +126,18 @@
 </p:presentation>
 </file>
 
+<file path=ppt/commentAuthors.xml><?xml version="1.0" encoding="utf-8"?>
+<p:cmAuthorLst xmlns:a="http://schemas.openxmlformats.org/drawingml/2006/main" xmlns:r="http://schemas.openxmlformats.org/officeDocument/2006/relationships" xmlns:p="http://schemas.openxmlformats.org/presentationml/2006/main">
+  <p:cmAuthor id="1" name="Mitchell Palmer" initials="MP" lastIdx="1" clrIdx="0">
+    <p:extLst>
+      <p:ext uri="{19B8F6BF-5375-455C-9EA6-DF929625EA0E}">
+        <p15:presenceInfo xmlns:p15="http://schemas.microsoft.com/office/powerpoint/2012/main" userId="77591f07d4b8d8b5" providerId="Windows Live"/>
+      </p:ext>
+    </p:extLst>
+  </p:cmAuthor>
+</p:cmAuthorLst>
+</file>
+
 <file path=ppt/revisionInfo.xml><?xml version="1.0" encoding="utf-8"?>
 <p1510:revInfo xmlns:a="http://schemas.openxmlformats.org/drawingml/2006/main" xmlns:r="http://schemas.openxmlformats.org/officeDocument/2006/relationships" xmlns:p1510="http://schemas.microsoft.com/office/powerpoint/2015/10/main">
   <p1510:revLst>
@@ -133,6 +145,20 @@
     <p1510:client id="{E47736E5-86E1-49E6-8F8B-54FBF2916D1D}" v="454" dt="2019-11-03T22:46:04.828"/>
   </p1510:revLst>
 </p1510:revInfo>
+</file>
+
+<file path=ppt/comments/comment1.xml><?xml version="1.0" encoding="utf-8"?>
+<p:cmLst xmlns:a="http://schemas.openxmlformats.org/drawingml/2006/main" xmlns:r="http://schemas.openxmlformats.org/officeDocument/2006/relationships" xmlns:p="http://schemas.openxmlformats.org/presentationml/2006/main">
+  <p:cm authorId="1" dt="2019-11-08T09:30:30.102" idx="1">
+    <p:pos x="6965" y="405"/>
+    <p:text>Sabetto: Text in the middle unclear of what it applies to; also can go a little more technical here in the diagram if you want.  Heartbeat was a good discussion point don't forget to mention.</p:text>
+    <p:extLst>
+      <p:ext uri="{C676402C-5697-4E1C-873F-D02D1690AC5C}">
+        <p15:threadingInfo xmlns:p15="http://schemas.microsoft.com/office/powerpoint/2012/main" timeZoneBias="300"/>
+      </p:ext>
+    </p:extLst>
+  </p:cm>
+</p:cmLst>
 </file>
 
 <file path=ppt/slideLayouts/slideLayout1.xml><?xml version="1.0" encoding="utf-8"?>
@@ -320,7 +346,7 @@
           <a:p>
             <a:fld id="{88D38747-4367-4BD2-8D51-C97E202738E2}" type="datetime1">
               <a:rPr lang="en-US" smtClean="0"/>
-              <a:t>11/3/2019</a:t>
+              <a:t>11/8/2019</a:t>
             </a:fld>
             <a:endParaRPr lang="en-US" dirty="0"/>
           </a:p>
@@ -625,7 +651,7 @@
           <a:p>
             <a:fld id="{11F1B079-7EF0-44EE-B798-BCC497C9F3B2}" type="datetime1">
               <a:rPr lang="en-US" smtClean="0"/>
-              <a:t>11/3/2019</a:t>
+              <a:t>11/8/2019</a:t>
             </a:fld>
             <a:endParaRPr lang="en-US" dirty="0"/>
           </a:p>
@@ -819,7 +845,7 @@
           <a:p>
             <a:fld id="{28FF70A8-1D13-4657-95F0-A9EA54967B8D}" type="datetime1">
               <a:rPr lang="en-US" smtClean="0"/>
-              <a:t>11/3/2019</a:t>
+              <a:t>11/8/2019</a:t>
             </a:fld>
             <a:endParaRPr lang="en-US" dirty="0"/>
           </a:p>
@@ -1082,7 +1108,7 @@
           <a:p>
             <a:fld id="{21EB90AC-71BD-4C7F-8ACA-7B3F18292E63}" type="datetime1">
               <a:rPr lang="en-US" smtClean="0"/>
-              <a:t>11/3/2019</a:t>
+              <a:t>11/8/2019</a:t>
             </a:fld>
             <a:endParaRPr lang="en-US" dirty="0"/>
           </a:p>
@@ -1518,7 +1544,7 @@
           <a:p>
             <a:fld id="{4E6EFC2C-8905-46F0-B443-CE905B76BA01}" type="datetime1">
               <a:rPr lang="en-US" smtClean="0"/>
-              <a:t>11/3/2019</a:t>
+              <a:t>11/8/2019</a:t>
             </a:fld>
             <a:endParaRPr lang="en-US" dirty="0"/>
           </a:p>
@@ -2055,7 +2081,7 @@
           <a:p>
             <a:fld id="{D9079DC3-C9B5-499E-9140-0DC28B7074E2}" type="datetime1">
               <a:rPr lang="en-US" smtClean="0"/>
-              <a:t>11/3/2019</a:t>
+              <a:t>11/8/2019</a:t>
             </a:fld>
             <a:endParaRPr lang="en-US" dirty="0"/>
           </a:p>
@@ -2937,7 +2963,7 @@
           <a:p>
             <a:fld id="{30BB33EA-E472-4D22-9C03-A9C14AA21CED}" type="datetime1">
               <a:rPr lang="en-US" smtClean="0"/>
-              <a:t>11/3/2019</a:t>
+              <a:t>11/8/2019</a:t>
             </a:fld>
             <a:endParaRPr lang="en-US" dirty="0"/>
           </a:p>
@@ -3107,7 +3133,7 @@
           <a:p>
             <a:fld id="{217E833E-1B6D-415F-AD29-75AE8C43BD0D}" type="datetime1">
               <a:rPr lang="en-US" smtClean="0"/>
-              <a:t>11/3/2019</a:t>
+              <a:t>11/8/2019</a:t>
             </a:fld>
             <a:endParaRPr lang="en-US" dirty="0"/>
           </a:p>
@@ -3291,7 +3317,7 @@
           <a:p>
             <a:fld id="{8452596F-08A7-4B70-989A-F2B1CF31E66B}" type="datetime1">
               <a:rPr lang="en-US" smtClean="0"/>
-              <a:t>11/3/2019</a:t>
+              <a:t>11/8/2019</a:t>
             </a:fld>
             <a:endParaRPr lang="en-US" dirty="0"/>
           </a:p>
@@ -3461,7 +3487,7 @@
           <a:p>
             <a:fld id="{73C55A3C-5767-4844-A0A3-83778C2E5409}" type="datetime1">
               <a:rPr lang="en-US" smtClean="0"/>
-              <a:t>11/3/2019</a:t>
+              <a:t>11/8/2019</a:t>
             </a:fld>
             <a:endParaRPr lang="en-US" dirty="0"/>
           </a:p>
@@ -3705,7 +3731,7 @@
           <a:p>
             <a:fld id="{CAE507A8-A5CF-4D38-AB86-7EDDA87A85D4}" type="datetime1">
               <a:rPr lang="en-US" smtClean="0"/>
-              <a:t>11/3/2019</a:t>
+              <a:t>11/8/2019</a:t>
             </a:fld>
             <a:endParaRPr lang="en-US" dirty="0"/>
           </a:p>
@@ -3947,7 +3973,7 @@
           <a:p>
             <a:fld id="{BDFCD27C-8599-43EF-BA1D-14DDC1946E06}" type="datetime1">
               <a:rPr lang="en-US" smtClean="0"/>
-              <a:t>11/3/2019</a:t>
+              <a:t>11/8/2019</a:t>
             </a:fld>
             <a:endParaRPr lang="en-US" dirty="0"/>
           </a:p>
@@ -4428,7 +4454,7 @@
           <a:p>
             <a:fld id="{49343D99-809A-49C0-96E5-4250D0B498EE}" type="datetime1">
               <a:rPr lang="en-US" smtClean="0"/>
-              <a:t>11/3/2019</a:t>
+              <a:t>11/8/2019</a:t>
             </a:fld>
             <a:endParaRPr lang="en-US" dirty="0"/>
           </a:p>
@@ -4546,7 +4572,7 @@
           <a:p>
             <a:fld id="{A143DE9B-B678-4EFB-BB7D-A4370204A0B0}" type="datetime1">
               <a:rPr lang="en-US" smtClean="0"/>
-              <a:t>11/3/2019</a:t>
+              <a:t>11/8/2019</a:t>
             </a:fld>
             <a:endParaRPr lang="en-US" dirty="0"/>
           </a:p>
@@ -4641,7 +4667,7 @@
           <a:p>
             <a:fld id="{E68812DA-F765-4142-A6A3-A8ED7235E082}" type="datetime1">
               <a:rPr lang="en-US" smtClean="0"/>
-              <a:t>11/3/2019</a:t>
+              <a:t>11/8/2019</a:t>
             </a:fld>
             <a:endParaRPr lang="en-US" dirty="0"/>
           </a:p>
@@ -4896,7 +4922,7 @@
           <a:p>
             <a:fld id="{3E0277FD-7DE6-41D4-930D-AC99F5AFE54E}" type="datetime1">
               <a:rPr lang="en-US" smtClean="0"/>
-              <a:t>11/3/2019</a:t>
+              <a:t>11/8/2019</a:t>
             </a:fld>
             <a:endParaRPr lang="en-US" dirty="0"/>
           </a:p>
@@ -5203,7 +5229,7 @@
           <a:p>
             <a:fld id="{9EA15526-7079-4B7B-987C-1B5FAE11A0FF}" type="datetime1">
               <a:rPr lang="en-US" smtClean="0"/>
-              <a:t>11/3/2019</a:t>
+              <a:t>11/8/2019</a:t>
             </a:fld>
             <a:endParaRPr lang="en-US" dirty="0"/>
           </a:p>
@@ -5438,7 +5464,7 @@
           <a:p>
             <a:fld id="{073ED0CC-082F-4160-86E5-0D6041F12778}" type="datetime1">
               <a:rPr lang="en-US" smtClean="0"/>
-              <a:t>11/3/2019</a:t>
+              <a:t>11/8/2019</a:t>
             </a:fld>
             <a:endParaRPr lang="en-US" dirty="0"/>
           </a:p>
@@ -6349,7 +6375,7 @@
           </a:effectLst>
           <a:extLst>
             <a:ext uri="{91240B29-F687-4f45-9708-019B960494DF}">
-              <a14:hiddenLine xmlns:a16="http://schemas.microsoft.com/office/drawing/2014/main" xmlns:p14="http://schemas.microsoft.com/office/powerpoint/2010/main" xmlns:a14="http://schemas.microsoft.com/office/drawing/2010/main" xmlns="" w="9525">
+              <a14:hiddenLine xmlns="" xmlns:a14="http://schemas.microsoft.com/office/drawing/2010/main" xmlns:p14="http://schemas.microsoft.com/office/powerpoint/2010/main" xmlns:a16="http://schemas.microsoft.com/office/drawing/2014/main" w="9525">
                 <a:solidFill>
                   <a:srgbClr val="000000"/>
                 </a:solidFill>
@@ -6390,19 +6416,19 @@
         </p:nvSpPr>
         <p:spPr>
           <a:xfrm>
-            <a:off x="2480733" y="2074339"/>
-            <a:ext cx="7219954" cy="1828801"/>
+            <a:off x="2480733" y="2887139"/>
+            <a:ext cx="7219954" cy="764683"/>
           </a:xfrm>
         </p:spPr>
         <p:txBody>
           <a:bodyPr>
-            <a:normAutofit/>
+            <a:normAutofit fontScale="90000"/>
           </a:bodyPr>
           <a:lstStyle/>
           <a:p>
             <a:r>
-              <a:rPr lang="en-US" sz="4800"/>
-              <a:t>E04: Draft Design Review</a:t>
+              <a:rPr lang="en-US" sz="4800" dirty="0"/>
+              <a:t>E05: Design Review</a:t>
             </a:r>
           </a:p>
         </p:txBody>
@@ -6425,23 +6451,77 @@
         </p:nvSpPr>
         <p:spPr>
           <a:xfrm>
-            <a:off x="2480733" y="3903138"/>
-            <a:ext cx="7219954" cy="1049867"/>
+            <a:off x="2480733" y="3651822"/>
+            <a:ext cx="7219954" cy="1301183"/>
           </a:xfrm>
         </p:spPr>
         <p:txBody>
           <a:bodyPr>
-            <a:normAutofit/>
+            <a:normAutofit fontScale="77500" lnSpcReduction="20000"/>
           </a:bodyPr>
           <a:lstStyle/>
           <a:p>
             <a:r>
-              <a:rPr lang="en-US"/>
+              <a:rPr lang="en-US" dirty="0"/>
+              <a:t>12/1/19</a:t>
+            </a:r>
+          </a:p>
+          <a:p>
+            <a:r>
+              <a:rPr lang="en-US" dirty="0"/>
+              <a:t>Sponsor: Lockheed Martin</a:t>
+            </a:r>
+          </a:p>
+          <a:p>
+            <a:r>
+              <a:rPr lang="en-US" dirty="0"/>
+              <a:t>Team BluSh3ll:</a:t>
+            </a:r>
+          </a:p>
+          <a:p>
+            <a:r>
+              <a:rPr lang="en-US" dirty="0"/>
               <a:t>Hunter Rowlette, Carl Bai, Andrew Chapin, Andre Herrera, Mitch Palmer</a:t>
             </a:r>
           </a:p>
         </p:txBody>
       </p:sp>
+      <p:pic>
+        <p:nvPicPr>
+          <p:cNvPr id="6" name="Picture 5">
+            <a:extLst>
+              <a:ext uri="{FF2B5EF4-FFF2-40B4-BE49-F238E27FC236}">
+                <a16:creationId xmlns:a16="http://schemas.microsoft.com/office/drawing/2014/main" id="{3DB82DFC-2FA0-47C3-8642-9DE11368B2EF}"/>
+              </a:ext>
+            </a:extLst>
+          </p:cNvPr>
+          <p:cNvPicPr>
+            <a:picLocks noChangeAspect="1"/>
+          </p:cNvPicPr>
+          <p:nvPr/>
+        </p:nvPicPr>
+        <p:blipFill>
+          <a:blip r:embed="rId4">
+            <a:extLst>
+              <a:ext uri="{28A0092B-C50C-407E-A947-70E740481C1C}">
+                <a14:useLocalDpi xmlns:a14="http://schemas.microsoft.com/office/drawing/2010/main" val="0"/>
+              </a:ext>
+            </a:extLst>
+          </a:blip>
+          <a:stretch>
+            <a:fillRect/>
+          </a:stretch>
+        </p:blipFill>
+        <p:spPr>
+          <a:xfrm>
+            <a:off x="5693710" y="2074339"/>
+            <a:ext cx="812800" cy="812800"/>
+          </a:xfrm>
+          <a:prstGeom prst="rect">
+            <a:avLst/>
+          </a:prstGeom>
+        </p:spPr>
+      </p:pic>
     </p:spTree>
     <p:extLst>
       <p:ext uri="{BB962C8B-B14F-4D97-AF65-F5344CB8AC3E}">
@@ -6579,9 +6659,8 @@
           </a:bodyPr>
           <a:lstStyle/>
           <a:p>
-            <a:pPr algn="l"/>
-            <a:r>
-              <a:rPr lang="en-US" sz="3000" kern="1200">
+            <a:r>
+              <a:rPr lang="en-US" sz="3000" kern="1200" dirty="0">
                 <a:ln>
                   <a:solidFill>
                     <a:schemeClr val="bg1">
@@ -6627,13 +6706,13 @@
         </p:nvSpPr>
         <p:spPr>
           <a:xfrm>
-            <a:off x="913796" y="2247153"/>
+            <a:off x="926073" y="1824364"/>
             <a:ext cx="3358084" cy="3544046"/>
           </a:xfrm>
         </p:spPr>
         <p:txBody>
           <a:bodyPr vert="horz" lIns="91440" tIns="45720" rIns="91440" bIns="45720" rtlCol="0" anchor="t">
-            <a:normAutofit lnSpcReduction="10000"/>
+            <a:normAutofit fontScale="92500" lnSpcReduction="10000"/>
           </a:bodyPr>
           <a:lstStyle/>
           <a:p>
@@ -6654,7 +6733,9 @@
                   </a:solidFill>
                 </a:ln>
                 <a:solidFill>
-                  <a:schemeClr val="tx2"/>
+                  <a:schemeClr val="accent6">
+                    <a:lumMod val="50000"/>
+                  </a:schemeClr>
                 </a:solidFill>
                 <a:effectLst>
                   <a:outerShdw blurRad="9525" dist="25400" dir="14640000" algn="tl" rotWithShape="0">
@@ -6667,15 +6748,8 @@
                 <a:ea typeface="+mn-ea"/>
                 <a:cs typeface="+mn-cs"/>
               </a:rPr>
-              <a:t>From a user’s perspective, they will start by selecting a data block to be packaged.</a:t>
-            </a:r>
-          </a:p>
-          <a:p>
-            <a:pPr>
-              <a:lnSpc>
-                <a:spcPct val="90000"/>
-              </a:lnSpc>
-            </a:pPr>
+              <a:t>Step 1: </a:t>
+            </a:r>
             <a:r>
               <a:rPr lang="en-US" sz="1700" kern="1200" dirty="0">
                 <a:ln>
@@ -6701,7 +6775,7 @@
                 <a:ea typeface="+mn-ea"/>
                 <a:cs typeface="+mn-cs"/>
               </a:rPr>
-              <a:t>From there, the data block will be copied to the packer’s server, where it will be packed and sent through the network to the selected receiver.</a:t>
+              <a:t>A data block (e.g. executable file) is selected by a user and sent to the packer application where it is packed.</a:t>
             </a:r>
           </a:p>
           <a:p>
@@ -6722,7 +6796,9 @@
                   </a:solidFill>
                 </a:ln>
                 <a:solidFill>
-                  <a:schemeClr val="tx2"/>
+                  <a:schemeClr val="accent6">
+                    <a:lumMod val="50000"/>
+                  </a:schemeClr>
                 </a:solidFill>
                 <a:effectLst>
                   <a:outerShdw blurRad="9525" dist="25400" dir="14640000" algn="tl" rotWithShape="0">
@@ -6735,7 +6811,137 @@
                 <a:ea typeface="+mn-ea"/>
                 <a:cs typeface="+mn-cs"/>
               </a:rPr>
-              <a:t>Once the receiving computer has completed receiving the encrypted data, the packer will decrypt the data block and will either run it or make it available on the system.</a:t>
+              <a:t>Step 2: </a:t>
+            </a:r>
+            <a:r>
+              <a:rPr lang="en-US" sz="1700" kern="1200" dirty="0">
+                <a:ln>
+                  <a:solidFill>
+                    <a:schemeClr val="bg1">
+                      <a:lumMod val="75000"/>
+                      <a:lumOff val="25000"/>
+                      <a:alpha val="10000"/>
+                    </a:schemeClr>
+                  </a:solidFill>
+                </a:ln>
+                <a:solidFill>
+                  <a:schemeClr val="tx2"/>
+                </a:solidFill>
+                <a:effectLst>
+                  <a:outerShdw blurRad="9525" dist="25400" dir="14640000" algn="tl" rotWithShape="0">
+                    <a:schemeClr val="bg1">
+                      <a:alpha val="30000"/>
+                    </a:schemeClr>
+                  </a:outerShdw>
+                </a:effectLst>
+                <a:latin typeface="+mn-lt"/>
+                <a:ea typeface="+mn-ea"/>
+                <a:cs typeface="+mn-cs"/>
+              </a:rPr>
+              <a:t>The now-packed data block is sent over the internet to the remote host.</a:t>
+            </a:r>
+          </a:p>
+          <a:p>
+            <a:pPr>
+              <a:lnSpc>
+                <a:spcPct val="90000"/>
+              </a:lnSpc>
+            </a:pPr>
+            <a:r>
+              <a:rPr lang="en-US" sz="1700" kern="1200" dirty="0">
+                <a:ln>
+                  <a:solidFill>
+                    <a:schemeClr val="bg1">
+                      <a:lumMod val="75000"/>
+                      <a:lumOff val="25000"/>
+                      <a:alpha val="10000"/>
+                    </a:schemeClr>
+                  </a:solidFill>
+                </a:ln>
+                <a:solidFill>
+                  <a:schemeClr val="accent6">
+                    <a:lumMod val="50000"/>
+                  </a:schemeClr>
+                </a:solidFill>
+                <a:effectLst>
+                  <a:outerShdw blurRad="9525" dist="25400" dir="14640000" algn="tl" rotWithShape="0">
+                    <a:schemeClr val="bg1">
+                      <a:alpha val="30000"/>
+                    </a:schemeClr>
+                  </a:outerShdw>
+                </a:effectLst>
+                <a:latin typeface="+mn-lt"/>
+                <a:ea typeface="+mn-ea"/>
+                <a:cs typeface="+mn-cs"/>
+              </a:rPr>
+              <a:t>Step 3: </a:t>
+            </a:r>
+            <a:r>
+              <a:rPr lang="en-US" sz="1700" dirty="0"/>
+              <a:t>The remote host receives the packed data with the running loader service.</a:t>
+            </a:r>
+          </a:p>
+          <a:p>
+            <a:pPr>
+              <a:lnSpc>
+                <a:spcPct val="90000"/>
+              </a:lnSpc>
+            </a:pPr>
+            <a:r>
+              <a:rPr lang="en-US" sz="1700" kern="1200" dirty="0">
+                <a:ln>
+                  <a:solidFill>
+                    <a:schemeClr val="bg1">
+                      <a:lumMod val="75000"/>
+                      <a:lumOff val="25000"/>
+                      <a:alpha val="10000"/>
+                    </a:schemeClr>
+                  </a:solidFill>
+                </a:ln>
+                <a:solidFill>
+                  <a:schemeClr val="accent6">
+                    <a:lumMod val="50000"/>
+                  </a:schemeClr>
+                </a:solidFill>
+                <a:effectLst>
+                  <a:outerShdw blurRad="9525" dist="25400" dir="14640000" algn="tl" rotWithShape="0">
+                    <a:schemeClr val="bg1">
+                      <a:alpha val="30000"/>
+                    </a:schemeClr>
+                  </a:outerShdw>
+                </a:effectLst>
+                <a:latin typeface="+mn-lt"/>
+                <a:ea typeface="+mn-ea"/>
+                <a:cs typeface="+mn-cs"/>
+              </a:rPr>
+              <a:t>Step 4: </a:t>
+            </a:r>
+            <a:r>
+              <a:rPr lang="en-US" sz="1700" kern="1200" dirty="0">
+                <a:ln>
+                  <a:solidFill>
+                    <a:schemeClr val="bg1">
+                      <a:lumMod val="75000"/>
+                      <a:lumOff val="25000"/>
+                      <a:alpha val="10000"/>
+                    </a:schemeClr>
+                  </a:solidFill>
+                </a:ln>
+                <a:solidFill>
+                  <a:schemeClr val="tx2"/>
+                </a:solidFill>
+                <a:effectLst>
+                  <a:outerShdw blurRad="9525" dist="25400" dir="14640000" algn="tl" rotWithShape="0">
+                    <a:schemeClr val="bg1">
+                      <a:alpha val="30000"/>
+                    </a:schemeClr>
+                  </a:outerShdw>
+                </a:effectLst>
+                <a:latin typeface="+mn-lt"/>
+                <a:ea typeface="+mn-ea"/>
+                <a:cs typeface="+mn-cs"/>
+              </a:rPr>
+              <a:t>The loader decrypts the data block and will either run it or make it available on the system.</a:t>
             </a:r>
           </a:p>
           <a:p>
@@ -6795,8 +7001,8 @@
         </p:blipFill>
         <p:spPr>
           <a:xfrm>
-            <a:off x="4915348" y="1824364"/>
-            <a:ext cx="6633184" cy="2785937"/>
+            <a:off x="4284157" y="983700"/>
+            <a:ext cx="7620741" cy="4384710"/>
           </a:xfrm>
           <a:prstGeom prst="rect">
             <a:avLst/>
@@ -7373,7 +7579,7 @@
         </p:nvSpPr>
         <p:spPr>
           <a:xfrm>
-            <a:off x="913796" y="643465"/>
+            <a:off x="970306" y="1019601"/>
             <a:ext cx="3382638" cy="1370605"/>
           </a:xfrm>
         </p:spPr>
@@ -7383,9 +7589,8 @@
           </a:bodyPr>
           <a:lstStyle/>
           <a:p>
-            <a:pPr algn="l"/>
-            <a:r>
-              <a:rPr lang="en-US" sz="3000" kern="1200">
+            <a:r>
+              <a:rPr lang="en-US" sz="3000" kern="1200" dirty="0">
                 <a:ln>
                   <a:solidFill>
                     <a:schemeClr val="bg1">
@@ -7741,8 +7946,8 @@
         </p:blipFill>
         <p:spPr>
           <a:xfrm>
-            <a:off x="4915348" y="1633660"/>
-            <a:ext cx="6633184" cy="3167345"/>
+            <a:off x="4409509" y="1372928"/>
+            <a:ext cx="7620363" cy="4112144"/>
           </a:xfrm>
           <a:prstGeom prst="rect">
             <a:avLst/>
@@ -7801,7 +8006,7 @@
           <a:lstStyle/>
           <a:p>
             <a:r>
-              <a:rPr lang="en-US">
+              <a:rPr lang="en-US" dirty="0">
                 <a:effectLst/>
               </a:rPr>
               <a:t>Verification Method</a:t>
@@ -7831,43 +8036,129 @@
           <a:bodyPr/>
           <a:lstStyle/>
           <a:p>
+            <a:pPr marL="494100" indent="-457200">
+              <a:buFont typeface="+mj-lt"/>
+              <a:buAutoNum type="arabicPeriod"/>
+            </a:pPr>
             <a:r>
               <a:rPr lang="en-US" dirty="0">
-                <a:effectLst/>
-              </a:rPr>
-              <a:t>Quality assurance through integration and unit tests of the packer and loader software products.</a:t>
-            </a:r>
-          </a:p>
-          <a:p>
+                <a:solidFill>
+                  <a:schemeClr val="accent6">
+                    <a:lumMod val="50000"/>
+                  </a:schemeClr>
+                </a:solidFill>
+                <a:effectLst/>
+              </a:rPr>
+              <a:t>Q.A.</a:t>
+            </a:r>
             <a:r>
               <a:rPr lang="en-US" dirty="0">
                 <a:effectLst/>
               </a:rPr>
-              <a:t>Final confirmation from the sponsor of the functionality of the product.</a:t>
-            </a:r>
-          </a:p>
-          <a:p>
+              <a:t> through </a:t>
+            </a:r>
             <a:r>
               <a:rPr lang="en-US" dirty="0">
-                <a:effectLst/>
-              </a:rPr>
-              <a:t>Customer testing in the environment which will provide user confirmation of the function of the product.</a:t>
-            </a:r>
-          </a:p>
-          <a:p>
+                <a:solidFill>
+                  <a:schemeClr val="accent6">
+                    <a:lumMod val="50000"/>
+                  </a:schemeClr>
+                </a:solidFill>
+                <a:effectLst/>
+              </a:rPr>
+              <a:t>integration and unit tests </a:t>
+            </a:r>
             <a:r>
               <a:rPr lang="en-US" dirty="0">
                 <a:effectLst/>
               </a:rPr>
-              <a:t>Alterations to be made as requested.</a:t>
-            </a:r>
-          </a:p>
-          <a:p>
+              <a:t>of the packer and loader software products.</a:t>
+            </a:r>
+          </a:p>
+          <a:p>
+            <a:pPr marL="494100" indent="-457200">
+              <a:buFont typeface="+mj-lt"/>
+              <a:buAutoNum type="arabicPeriod"/>
+            </a:pPr>
             <a:r>
               <a:rPr lang="en-US" dirty="0">
-                <a:effectLst/>
-              </a:rPr>
-              <a:t>Final packaging to meet sponsor and customer requests.</a:t>
+                <a:solidFill>
+                  <a:schemeClr val="accent6">
+                    <a:lumMod val="50000"/>
+                  </a:schemeClr>
+                </a:solidFill>
+                <a:effectLst/>
+              </a:rPr>
+              <a:t>Final confirmation from the sponsor</a:t>
+            </a:r>
+            <a:r>
+              <a:rPr lang="en-US" dirty="0">
+                <a:effectLst/>
+              </a:rPr>
+              <a:t> of the functionality of the product.</a:t>
+            </a:r>
+          </a:p>
+          <a:p>
+            <a:pPr marL="494100" indent="-457200">
+              <a:buFont typeface="+mj-lt"/>
+              <a:buAutoNum type="arabicPeriod"/>
+            </a:pPr>
+            <a:r>
+              <a:rPr lang="en-US" dirty="0">
+                <a:solidFill>
+                  <a:schemeClr val="accent6">
+                    <a:lumMod val="50000"/>
+                  </a:schemeClr>
+                </a:solidFill>
+                <a:effectLst/>
+              </a:rPr>
+              <a:t>Customer testing </a:t>
+            </a:r>
+            <a:r>
+              <a:rPr lang="en-US" dirty="0">
+                <a:effectLst/>
+              </a:rPr>
+              <a:t>in the environment which will provide user confirmation and feedback of product function</a:t>
+            </a:r>
+          </a:p>
+          <a:p>
+            <a:pPr marL="494100" indent="-457200">
+              <a:buFont typeface="+mj-lt"/>
+              <a:buAutoNum type="arabicPeriod"/>
+            </a:pPr>
+            <a:r>
+              <a:rPr lang="en-US" dirty="0">
+                <a:solidFill>
+                  <a:schemeClr val="accent6">
+                    <a:lumMod val="50000"/>
+                  </a:schemeClr>
+                </a:solidFill>
+                <a:effectLst/>
+              </a:rPr>
+              <a:t>Alterations made as requested.</a:t>
+            </a:r>
+          </a:p>
+          <a:p>
+            <a:pPr marL="494100" indent="-457200">
+              <a:buFont typeface="+mj-lt"/>
+              <a:buAutoNum type="arabicPeriod"/>
+            </a:pPr>
+            <a:r>
+              <a:rPr lang="en-US" dirty="0">
+                <a:solidFill>
+                  <a:schemeClr val="accent6">
+                    <a:lumMod val="50000"/>
+                  </a:schemeClr>
+                </a:solidFill>
+                <a:effectLst/>
+              </a:rPr>
+              <a:t>Final packaging </a:t>
+            </a:r>
+            <a:r>
+              <a:rPr lang="en-US" dirty="0">
+                <a:effectLst/>
+              </a:rPr>
+              <a:t>to meet sponsor and customer requests.</a:t>
             </a:r>
           </a:p>
           <a:p>
@@ -8481,39 +8772,24 @@
           </a:bodyPr>
           <a:lstStyle/>
           <a:p>
-            <a:r>
-              <a:rPr lang="en-US" dirty="0"/>
-              <a:t>Delivery of various files and executables to remote systems is an area of concern for Cybersecurity risks to LM and its customers.</a:t>
-            </a:r>
-          </a:p>
-          <a:p>
-            <a:r>
-              <a:rPr lang="en-US" dirty="0"/>
-              <a:t>LM desires a method to securely deliver files, executables, updates and data to remote systems through a packer/loader tool.</a:t>
-            </a:r>
-          </a:p>
-          <a:p>
-            <a:r>
-              <a:rPr lang="en-US" dirty="0"/>
-              <a:t>The packer is to be a program on the local system that will compress and encrypt data.</a:t>
-            </a:r>
-          </a:p>
-          <a:p>
-            <a:r>
-              <a:rPr lang="en-US" dirty="0"/>
-              <a:t>The loader is a process that will be run on the remote system, listening for incoming data.</a:t>
-            </a:r>
-          </a:p>
-          <a:p>
-            <a:r>
-              <a:rPr lang="en-US" dirty="0"/>
-              <a:t>The loader should automatically decrypt and decompress incoming data.</a:t>
-            </a:r>
-          </a:p>
-          <a:p>
-            <a:r>
-              <a:rPr lang="en-US" dirty="0"/>
-              <a:t>If the data is detected to be an executable file, the file should be run automatically completely in memory.</a:t>
+            <a:pPr marL="36900" indent="0" algn="ctr">
+              <a:buNone/>
+            </a:pPr>
+            <a:endParaRPr lang="en-US" sz="2800" dirty="0"/>
+          </a:p>
+          <a:p>
+            <a:pPr marL="36900" indent="0" algn="ctr">
+              <a:buNone/>
+            </a:pPr>
+            <a:endParaRPr lang="en-US" sz="2800" dirty="0"/>
+          </a:p>
+          <a:p>
+            <a:pPr marL="36900" indent="0" algn="ctr">
+              <a:buNone/>
+            </a:pPr>
+            <a:r>
+              <a:rPr lang="en-US" sz="2800" dirty="0"/>
+              <a:t>How do you deploy an executable to a remote system securely?</a:t>
             </a:r>
           </a:p>
         </p:txBody>
@@ -8598,70 +8874,172 @@
         <p:spPr/>
         <p:txBody>
           <a:bodyPr>
-            <a:normAutofit fontScale="85000" lnSpcReduction="20000"/>
+            <a:normAutofit fontScale="92500" lnSpcReduction="10000"/>
           </a:bodyPr>
           <a:lstStyle/>
           <a:p>
             <a:pPr lvl="0"/>
             <a:r>
+              <a:rPr lang="en-US" b="1" dirty="0">
+                <a:solidFill>
+                  <a:schemeClr val="accent6">
+                    <a:lumMod val="50000"/>
+                  </a:schemeClr>
+                </a:solidFill>
+                <a:effectLst/>
+              </a:rPr>
+              <a:t>Compress/encrypt </a:t>
+            </a:r>
+            <a:r>
               <a:rPr lang="en-US" dirty="0">
                 <a:effectLst/>
               </a:rPr>
-              <a:t>Ability to compress and encrypt a Windows based binary executable</a:t>
+              <a:t>a Windows binary executable</a:t>
             </a:r>
           </a:p>
           <a:p>
             <a:pPr lvl="0"/>
             <a:r>
+              <a:rPr lang="en-US" b="1" dirty="0">
+                <a:solidFill>
+                  <a:schemeClr val="accent6">
+                    <a:lumMod val="50000"/>
+                  </a:schemeClr>
+                </a:solidFill>
+                <a:effectLst/>
+              </a:rPr>
+              <a:t>Password-based</a:t>
+            </a:r>
+            <a:r>
               <a:rPr lang="en-US" dirty="0">
-                <a:effectLst/>
-              </a:rPr>
-              <a:t>Encryption should be password based</a:t>
+                <a:solidFill>
+                  <a:schemeClr val="accent6">
+                    <a:lumMod val="50000"/>
+                  </a:schemeClr>
+                </a:solidFill>
+                <a:effectLst/>
+              </a:rPr>
+              <a:t> </a:t>
+            </a:r>
+            <a:r>
+              <a:rPr lang="en-US" dirty="0">
+                <a:effectLst/>
+              </a:rPr>
+              <a:t>encryption</a:t>
             </a:r>
           </a:p>
           <a:p>
             <a:pPr lvl="0"/>
             <a:r>
+              <a:rPr lang="en-US" b="1" dirty="0">
+                <a:solidFill>
+                  <a:schemeClr val="accent6">
+                    <a:lumMod val="50000"/>
+                  </a:schemeClr>
+                </a:solidFill>
+                <a:effectLst/>
+              </a:rPr>
+              <a:t>PE </a:t>
+            </a:r>
+            <a:r>
               <a:rPr lang="en-US" dirty="0">
                 <a:effectLst/>
               </a:rPr>
-              <a:t>Portable Executable (PE) file format binary executables must be supported</a:t>
+              <a:t>file format support</a:t>
             </a:r>
           </a:p>
           <a:p>
             <a:pPr lvl="0"/>
             <a:r>
+              <a:rPr lang="en-US" b="1" dirty="0">
+                <a:solidFill>
+                  <a:schemeClr val="accent6">
+                    <a:lumMod val="50000"/>
+                  </a:schemeClr>
+                </a:solidFill>
+                <a:effectLst/>
+              </a:rPr>
+              <a:t>Output to a single file</a:t>
+            </a:r>
+          </a:p>
+          <a:p>
+            <a:pPr lvl="0"/>
+            <a:r>
+              <a:rPr lang="en-US" b="1" dirty="0">
+                <a:solidFill>
+                  <a:schemeClr val="accent6">
+                    <a:lumMod val="50000"/>
+                  </a:schemeClr>
+                </a:solidFill>
+                <a:effectLst/>
+              </a:rPr>
+              <a:t>Dynamic linking </a:t>
+            </a:r>
+            <a:r>
               <a:rPr lang="en-US" dirty="0">
                 <a:effectLst/>
               </a:rPr>
-              <a:t>Compression/Encryption (Packer) capability must output to a single file</a:t>
+              <a:t>across libraries (packer)</a:t>
             </a:r>
           </a:p>
           <a:p>
             <a:pPr lvl="0"/>
             <a:r>
+              <a:rPr lang="en-US" b="1" dirty="0">
+                <a:solidFill>
+                  <a:schemeClr val="accent6">
+                    <a:lumMod val="50000"/>
+                  </a:schemeClr>
+                </a:solidFill>
+                <a:effectLst/>
+              </a:rPr>
+              <a:t>Loader</a:t>
+            </a:r>
+            <a:r>
               <a:rPr lang="en-US" dirty="0">
                 <a:effectLst/>
               </a:rPr>
-              <a:t>Packer must be able to support dynamic linking against libraries</a:t>
+              <a:t> decrypts packer output</a:t>
             </a:r>
           </a:p>
           <a:p>
             <a:pPr lvl="0"/>
             <a:r>
+              <a:rPr lang="en-US" b="1" dirty="0">
+                <a:solidFill>
+                  <a:schemeClr val="accent6">
+                    <a:lumMod val="50000"/>
+                  </a:schemeClr>
+                </a:solidFill>
+                <a:effectLst/>
+              </a:rPr>
+              <a:t>User defined, configurable parameters </a:t>
+            </a:r>
+            <a:r>
               <a:rPr lang="en-US" dirty="0">
                 <a:effectLst/>
               </a:rPr>
-              <a:t>Loader must be able to take Packer output and decrypt it</a:t>
+              <a:t>(loader)</a:t>
             </a:r>
           </a:p>
           <a:p>
             <a:pPr lvl="0"/>
             <a:r>
+              <a:rPr lang="en-US" b="1" dirty="0">
+                <a:solidFill>
+                  <a:schemeClr val="accent6">
+                    <a:lumMod val="50000"/>
+                  </a:schemeClr>
+                </a:solidFill>
+                <a:effectLst/>
+              </a:rPr>
+              <a:t>Auto-run executables </a:t>
+            </a:r>
+            <a:r>
               <a:rPr lang="en-US" dirty="0">
                 <a:effectLst/>
               </a:rPr>
-              <a:t>Loader must be able to output Packer file contents based on user defined, configurable parameters</a:t>
+              <a:t>(loader); but only by flag</a:t>
             </a:r>
           </a:p>
           <a:p>
@@ -8670,26 +9048,51 @@
               <a:rPr lang="en-US" dirty="0">
                 <a:effectLst/>
               </a:rPr>
-              <a:t>Loader must be able to identify when Packer file contents are executables and run them</a:t>
-            </a:r>
-          </a:p>
-          <a:p>
-            <a:pPr lvl="0"/>
+              <a:t>Executables run </a:t>
+            </a:r>
+            <a:r>
+              <a:rPr lang="en-US" b="1" dirty="0">
+                <a:solidFill>
+                  <a:schemeClr val="accent6">
+                    <a:lumMod val="50000"/>
+                  </a:schemeClr>
+                </a:solidFill>
+                <a:effectLst/>
+              </a:rPr>
+              <a:t>in memory </a:t>
+            </a:r>
             <a:r>
               <a:rPr lang="en-US" dirty="0">
                 <a:effectLst/>
               </a:rPr>
-              <a:t>Running of executables by the Loader capability must be configurable, allowing user to toggle between an automatic run and a prompt during decryption/decompression</a:t>
-            </a:r>
-          </a:p>
-          <a:p>
-            <a:pPr lvl="0"/>
+              <a:t>as a </a:t>
+            </a:r>
+            <a:r>
+              <a:rPr lang="en-US" b="1" dirty="0">
+                <a:solidFill>
+                  <a:schemeClr val="accent6">
+                    <a:lumMod val="50000"/>
+                  </a:schemeClr>
+                </a:solidFill>
+                <a:effectLst/>
+              </a:rPr>
+              <a:t>separate thread/process</a:t>
+            </a:r>
+            <a:r>
+              <a:rPr lang="en-US" b="1" dirty="0">
+                <a:effectLst/>
+              </a:rPr>
+              <a:t> </a:t>
+            </a:r>
             <a:r>
               <a:rPr lang="en-US" dirty="0">
                 <a:effectLst/>
               </a:rPr>
-              <a:t>Loader must run executables in memory as a separate thread/process</a:t>
-            </a:r>
+              <a:t>(loader)</a:t>
+            </a:r>
+            <a:endParaRPr lang="en-US" b="1" dirty="0">
+              <a:effectLst/>
+            </a:endParaRPr>
           </a:p>
           <a:p>
             <a:endParaRPr lang="en-US" dirty="0"/>
@@ -8751,7 +9154,7 @@
               <a:rPr lang="en-US" dirty="0">
                 <a:effectLst/>
               </a:rPr>
-              <a:t>Desired Objectives</a:t>
+              <a:t>Desired – not required - Objectives</a:t>
             </a:r>
             <a:endParaRPr lang="en-US" dirty="0"/>
           </a:p>
@@ -8776,7 +9179,7 @@
         <p:spPr/>
         <p:txBody>
           <a:bodyPr>
-            <a:normAutofit lnSpcReduction="10000"/>
+            <a:normAutofit/>
           </a:bodyPr>
           <a:lstStyle/>
           <a:p>
@@ -8785,16 +9188,38 @@
               <a:rPr lang="en-US" dirty="0">
                 <a:effectLst/>
               </a:rPr>
-              <a:t>Compression and encryption of multiple files at a time to a single file</a:t>
+              <a:t>Compression/encryption of </a:t>
+            </a:r>
+            <a:r>
+              <a:rPr lang="en-US" dirty="0">
+                <a:solidFill>
+                  <a:schemeClr val="accent6">
+                    <a:lumMod val="50000"/>
+                  </a:schemeClr>
+                </a:solidFill>
+                <a:effectLst/>
+              </a:rPr>
+              <a:t>multiple files -&gt; a single file</a:t>
             </a:r>
           </a:p>
           <a:p>
             <a:pPr lvl="0"/>
             <a:r>
               <a:rPr lang="en-US" dirty="0">
-                <a:effectLst/>
-              </a:rPr>
-              <a:t>PE32+ file format binary executables supported</a:t>
+                <a:solidFill>
+                  <a:schemeClr val="accent6">
+                    <a:lumMod val="50000"/>
+                  </a:schemeClr>
+                </a:solidFill>
+                <a:effectLst/>
+              </a:rPr>
+              <a:t>PE32+, ELF, Mach-O </a:t>
+            </a:r>
+            <a:r>
+              <a:rPr lang="en-US" dirty="0">
+                <a:effectLst/>
+              </a:rPr>
+              <a:t>file format supported</a:t>
             </a:r>
           </a:p>
           <a:p>
@@ -8803,7 +9228,24 @@
               <a:rPr lang="en-US" dirty="0">
                 <a:effectLst/>
               </a:rPr>
-              <a:t>Loader never touches disk (e.g. everything happens in memory: decryption, decompression, and execution)</a:t>
+              <a:t>Loader </a:t>
+            </a:r>
+            <a:r>
+              <a:rPr lang="en-US" dirty="0">
+                <a:solidFill>
+                  <a:schemeClr val="accent6">
+                    <a:lumMod val="50000"/>
+                  </a:schemeClr>
+                </a:solidFill>
+                <a:effectLst/>
+              </a:rPr>
+              <a:t>never touches disk </a:t>
+            </a:r>
+            <a:r>
+              <a:rPr lang="en-US" dirty="0">
+                <a:effectLst/>
+              </a:rPr>
+              <a:t>(e.g. everything in memory: decryption/compression, and exec)</a:t>
             </a:r>
           </a:p>
           <a:p>
@@ -8812,47 +9254,62 @@
               <a:rPr lang="en-US" dirty="0">
                 <a:effectLst/>
               </a:rPr>
-              <a:t>Packer supports both static and dynamic linking against libraries</a:t>
+              <a:t>Both </a:t>
+            </a:r>
+            <a:r>
+              <a:rPr lang="en-US" dirty="0">
+                <a:solidFill>
+                  <a:schemeClr val="accent6">
+                    <a:lumMod val="50000"/>
+                  </a:schemeClr>
+                </a:solidFill>
+                <a:effectLst/>
+              </a:rPr>
+              <a:t>static and dynamic linking </a:t>
+            </a:r>
+            <a:r>
+              <a:rPr lang="en-US" dirty="0">
+                <a:effectLst/>
+              </a:rPr>
+              <a:t>across libraries (packer)</a:t>
             </a:r>
           </a:p>
           <a:p>
             <a:pPr lvl="0"/>
             <a:r>
               <a:rPr lang="en-US" dirty="0">
-                <a:effectLst/>
-              </a:rPr>
-              <a:t>Ability to also run in Linux/compress and encrypt a Linux based binary executable</a:t>
-            </a:r>
-          </a:p>
-          <a:p>
-            <a:pPr lvl="0"/>
+                <a:solidFill>
+                  <a:schemeClr val="accent6">
+                    <a:lumMod val="50000"/>
+                  </a:schemeClr>
+                </a:solidFill>
+                <a:effectLst/>
+              </a:rPr>
+              <a:t>Linux</a:t>
+            </a:r>
             <a:r>
               <a:rPr lang="en-US" dirty="0">
                 <a:effectLst/>
               </a:rPr>
-              <a:t>ELF file format binary executables supported</a:t>
-            </a:r>
-          </a:p>
-          <a:p>
-            <a:pPr lvl="0"/>
+              <a:t> and </a:t>
+            </a:r>
             <a:r>
               <a:rPr lang="en-US" dirty="0">
-                <a:effectLst/>
-              </a:rPr>
-              <a:t>Ability to also run in macOS/compress and encrypt a macOS based binary executable</a:t>
-            </a:r>
-          </a:p>
-          <a:p>
-            <a:pPr lvl="0"/>
+                <a:solidFill>
+                  <a:schemeClr val="accent6">
+                    <a:lumMod val="50000"/>
+                  </a:schemeClr>
+                </a:solidFill>
+                <a:effectLst/>
+              </a:rPr>
+              <a:t>MAC</a:t>
+            </a:r>
             <a:r>
               <a:rPr lang="en-US" dirty="0">
                 <a:effectLst/>
               </a:rPr>
-              <a:t>Mach-O file format binary executables supported</a:t>
-            </a:r>
-          </a:p>
-          <a:p>
-            <a:endParaRPr lang="en-US" dirty="0"/>
+              <a:t> OS support in addition to Windows</a:t>
+            </a:r>
           </a:p>
         </p:txBody>
       </p:sp>
@@ -8911,7 +9368,7 @@
               <a:rPr lang="en-US" dirty="0">
                 <a:effectLst/>
               </a:rPr>
-              <a:t>Technical Approach</a:t>
+              <a:t>Overview - Technical Approach</a:t>
             </a:r>
             <a:endParaRPr lang="en-US" dirty="0"/>
           </a:p>
@@ -9039,7 +9496,7 @@
           <a:lstStyle/>
           <a:p>
             <a:r>
-              <a:rPr lang="en-US">
+              <a:rPr lang="en-US" dirty="0">
                 <a:effectLst/>
               </a:rPr>
               <a:t>Major Tasks</a:t>
@@ -9085,7 +9542,7 @@
               <a:buNone/>
             </a:pPr>
             <a:r>
-              <a:rPr lang="en-US" sz="2700">
+              <a:rPr lang="en-US" sz="2700" dirty="0">
                 <a:effectLst/>
               </a:rPr>
               <a:t>Research &amp; Design</a:t>
@@ -9094,7 +9551,7 @@
           <a:p>
             <a:pPr lvl="1"/>
             <a:r>
-              <a:rPr lang="en-US" sz="2500">
+              <a:rPr lang="en-US" sz="2500" dirty="0">
                 <a:effectLst/>
               </a:rPr>
               <a:t>Existing Tools</a:t>
@@ -9103,7 +9560,7 @@
           <a:p>
             <a:pPr lvl="1"/>
             <a:r>
-              <a:rPr lang="en-US" sz="2700">
+              <a:rPr lang="en-US" sz="2700" dirty="0">
                 <a:effectLst/>
               </a:rPr>
               <a:t>General Architecture</a:t>
@@ -9112,7 +9569,7 @@
           <a:p>
             <a:pPr lvl="1"/>
             <a:r>
-              <a:rPr lang="en-US" sz="2700">
+              <a:rPr lang="en-US" sz="2700" dirty="0">
                 <a:effectLst/>
               </a:rPr>
               <a:t>Design</a:t>
@@ -9120,43 +9577,43 @@
           </a:p>
           <a:p>
             <a:pPr lvl="0"/>
-            <a:endParaRPr lang="en-US" sz="2700">
+            <a:endParaRPr lang="en-US" sz="2700" dirty="0">
               <a:effectLst/>
             </a:endParaRPr>
           </a:p>
           <a:p>
             <a:pPr lvl="0"/>
-            <a:endParaRPr lang="en-US" sz="2700">
+            <a:endParaRPr lang="en-US" sz="2700" dirty="0">
               <a:effectLst/>
             </a:endParaRPr>
           </a:p>
           <a:p>
             <a:pPr lvl="0"/>
-            <a:endParaRPr lang="en-US" sz="2700">
+            <a:endParaRPr lang="en-US" sz="2700" dirty="0">
               <a:effectLst/>
             </a:endParaRPr>
           </a:p>
           <a:p>
             <a:pPr lvl="0"/>
-            <a:endParaRPr lang="en-US" sz="2700">
+            <a:endParaRPr lang="en-US" sz="2700" dirty="0">
               <a:effectLst/>
             </a:endParaRPr>
           </a:p>
           <a:p>
             <a:pPr lvl="0"/>
-            <a:endParaRPr lang="en-US" sz="2700">
+            <a:endParaRPr lang="en-US" sz="2700" dirty="0">
               <a:effectLst/>
             </a:endParaRPr>
           </a:p>
           <a:p>
             <a:pPr lvl="0"/>
-            <a:endParaRPr lang="en-US" sz="2700">
+            <a:endParaRPr lang="en-US" sz="2700" dirty="0">
               <a:effectLst/>
             </a:endParaRPr>
           </a:p>
           <a:p>
             <a:pPr lvl="0"/>
-            <a:endParaRPr lang="en-US" sz="2700">
+            <a:endParaRPr lang="en-US" sz="2700" dirty="0">
               <a:effectLst/>
             </a:endParaRPr>
           </a:p>
@@ -9164,7 +9621,7 @@
             <a:pPr marL="36900" lvl="0" indent="0">
               <a:buNone/>
             </a:pPr>
-            <a:endParaRPr lang="en-US" sz="2700">
+            <a:endParaRPr lang="en-US" sz="2700" dirty="0">
               <a:effectLst/>
             </a:endParaRPr>
           </a:p>
@@ -9173,7 +9630,7 @@
               <a:buNone/>
             </a:pPr>
             <a:r>
-              <a:rPr lang="en-US" sz="2700">
+              <a:rPr lang="en-US" sz="2700" dirty="0">
                 <a:effectLst/>
               </a:rPr>
               <a:t>Implementation/Coding</a:t>
@@ -9182,7 +9639,7 @@
           <a:p>
             <a:pPr lvl="1"/>
             <a:r>
-              <a:rPr lang="en-US" sz="2700">
+              <a:rPr lang="en-US" sz="2700" dirty="0">
                 <a:effectLst/>
               </a:rPr>
               <a:t>Packer initial development</a:t>
@@ -9191,7 +9648,7 @@
           <a:p>
             <a:pPr lvl="1"/>
             <a:r>
-              <a:rPr lang="en-US" sz="2700">
+              <a:rPr lang="en-US" sz="2700" dirty="0">
                 <a:effectLst/>
               </a:rPr>
               <a:t>Loader initial development</a:t>
@@ -9200,7 +9657,7 @@
           <a:p>
             <a:pPr lvl="1"/>
             <a:r>
-              <a:rPr lang="en-US" sz="2700">
+              <a:rPr lang="en-US" sz="2700" dirty="0">
                 <a:effectLst/>
               </a:rPr>
               <a:t>Packer loader networking development</a:t>
@@ -9209,7 +9666,7 @@
           <a:p>
             <a:pPr lvl="1"/>
             <a:r>
-              <a:rPr lang="en-US" sz="2700">
+              <a:rPr lang="en-US" sz="2700" dirty="0">
                 <a:effectLst/>
               </a:rPr>
               <a:t>Packer / Loader networking integration</a:t>
@@ -9218,7 +9675,7 @@
           <a:p>
             <a:pPr lvl="1"/>
             <a:r>
-              <a:rPr lang="en-US" sz="2700">
+              <a:rPr lang="en-US" sz="2700" dirty="0">
                 <a:effectLst/>
               </a:rPr>
               <a:t>Deployment mechanism development</a:t>
@@ -9226,13 +9683,13 @@
           </a:p>
           <a:p>
             <a:pPr lvl="1"/>
-            <a:endParaRPr lang="en-US" sz="2700">
+            <a:endParaRPr lang="en-US" sz="2700" dirty="0">
               <a:effectLst/>
             </a:endParaRPr>
           </a:p>
           <a:p>
             <a:pPr lvl="1"/>
-            <a:endParaRPr lang="en-US" sz="2700">
+            <a:endParaRPr lang="en-US" sz="2700" dirty="0">
               <a:effectLst/>
             </a:endParaRPr>
           </a:p>
@@ -9241,7 +9698,7 @@
               <a:buNone/>
             </a:pPr>
             <a:r>
-              <a:rPr lang="en-US" sz="2700">
+              <a:rPr lang="en-US" sz="2700" dirty="0">
                 <a:effectLst/>
               </a:rPr>
               <a:t>Testing &amp; Quality Assurance (Q.A.)</a:t>
@@ -9250,7 +9707,7 @@
           <a:p>
             <a:pPr lvl="1"/>
             <a:r>
-              <a:rPr lang="en-US" sz="2700">
+              <a:rPr lang="en-US" sz="2700" dirty="0">
                 <a:effectLst/>
               </a:rPr>
               <a:t>Packer Quality Assurance</a:t>
@@ -9259,7 +9716,7 @@
           <a:p>
             <a:pPr lvl="1"/>
             <a:r>
-              <a:rPr lang="en-US" sz="2700">
+              <a:rPr lang="en-US" sz="2700" dirty="0">
                 <a:effectLst/>
               </a:rPr>
               <a:t>Loader Quality Assurance</a:t>
@@ -9268,32 +9725,32 @@
           <a:p>
             <a:pPr lvl="1"/>
             <a:r>
-              <a:rPr lang="en-US" sz="2700">
-                <a:effectLst/>
-              </a:rPr>
-              <a:t>networking Integration Quality Assurance</a:t>
+              <a:rPr lang="en-US" sz="2700" dirty="0">
+                <a:effectLst/>
+              </a:rPr>
+              <a:t>Networking Integration Quality Assurance</a:t>
             </a:r>
           </a:p>
           <a:p>
             <a:pPr lvl="1"/>
             <a:r>
-              <a:rPr lang="en-US" sz="2700">
-                <a:effectLst/>
-              </a:rPr>
-              <a:t>customer testing in environment</a:t>
+              <a:rPr lang="en-US" sz="2700" dirty="0">
+                <a:effectLst/>
+              </a:rPr>
+              <a:t>Customer testing in environment</a:t>
             </a:r>
           </a:p>
           <a:p>
             <a:pPr lvl="1"/>
             <a:r>
-              <a:rPr lang="en-US" sz="2700">
-                <a:effectLst/>
-              </a:rPr>
-              <a:t>final developed for packaging and workflow to meet customer requests</a:t>
-            </a:r>
-          </a:p>
-          <a:p>
-            <a:endParaRPr lang="en-US"/>
+              <a:rPr lang="en-US" sz="2700" dirty="0">
+                <a:effectLst/>
+              </a:rPr>
+              <a:t>Final developed for packaging and workflow to meet customer requests</a:t>
+            </a:r>
+          </a:p>
+          <a:p>
+            <a:endParaRPr lang="en-US" dirty="0"/>
           </a:p>
         </p:txBody>
       </p:sp>
@@ -9463,7 +9920,7 @@
         <p:spPr/>
         <p:txBody>
           <a:bodyPr>
-            <a:normAutofit lnSpcReduction="10000"/>
+            <a:normAutofit/>
           </a:bodyPr>
           <a:lstStyle/>
           <a:p>
@@ -9472,7 +9929,24 @@
               <a:rPr lang="en-US" dirty="0">
                 <a:effectLst/>
               </a:rPr>
-              <a:t>A packer and a loader, two separate pieces of software</a:t>
+              <a:t>A </a:t>
+            </a:r>
+            <a:r>
+              <a:rPr lang="en-US" dirty="0">
+                <a:solidFill>
+                  <a:schemeClr val="accent6">
+                    <a:lumMod val="50000"/>
+                  </a:schemeClr>
+                </a:solidFill>
+                <a:effectLst/>
+              </a:rPr>
+              <a:t>packer and a loader</a:t>
+            </a:r>
+            <a:r>
+              <a:rPr lang="en-US" dirty="0">
+                <a:effectLst/>
+              </a:rPr>
+              <a:t>, two separate pieces of software</a:t>
             </a:r>
           </a:p>
           <a:p>
@@ -9481,7 +9955,35 @@
               <a:rPr lang="en-US" dirty="0">
                 <a:effectLst/>
               </a:rPr>
-              <a:t>The packer shall compress and encrypt a Windows based binary executable</a:t>
+              <a:t>The packer shall </a:t>
+            </a:r>
+            <a:r>
+              <a:rPr lang="en-US" dirty="0">
+                <a:solidFill>
+                  <a:schemeClr val="accent6">
+                    <a:lumMod val="50000"/>
+                  </a:schemeClr>
+                </a:solidFill>
+                <a:effectLst/>
+              </a:rPr>
+              <a:t>compress and encrypt</a:t>
+            </a:r>
+            <a:r>
+              <a:rPr lang="en-US" dirty="0">
+                <a:effectLst/>
+              </a:rPr>
+              <a:t> </a:t>
+            </a:r>
+            <a:r>
+              <a:rPr lang="en-US" dirty="0">
+                <a:solidFill>
+                  <a:schemeClr val="accent6">
+                    <a:lumMod val="50000"/>
+                  </a:schemeClr>
+                </a:solidFill>
+                <a:effectLst/>
+              </a:rPr>
+              <a:t>a Windows binary executable</a:t>
             </a:r>
           </a:p>
           <a:p>
@@ -9490,7 +9992,35 @@
               <a:rPr lang="en-US" dirty="0">
                 <a:effectLst/>
               </a:rPr>
-              <a:t>The loader shall listen for incoming packed data and decrypts it</a:t>
+              <a:t>The loader shall </a:t>
+            </a:r>
+            <a:r>
+              <a:rPr lang="en-US" dirty="0">
+                <a:solidFill>
+                  <a:schemeClr val="accent6">
+                    <a:lumMod val="50000"/>
+                  </a:schemeClr>
+                </a:solidFill>
+                <a:effectLst/>
+              </a:rPr>
+              <a:t>listen</a:t>
+            </a:r>
+            <a:r>
+              <a:rPr lang="en-US" dirty="0">
+                <a:effectLst/>
+              </a:rPr>
+              <a:t> for incoming packed data </a:t>
+            </a:r>
+            <a:r>
+              <a:rPr lang="en-US" dirty="0">
+                <a:solidFill>
+                  <a:schemeClr val="accent6">
+                    <a:lumMod val="50000"/>
+                  </a:schemeClr>
+                </a:solidFill>
+                <a:effectLst/>
+              </a:rPr>
+              <a:t>and decrypt it</a:t>
             </a:r>
           </a:p>
           <a:p>
@@ -9499,8 +10029,67 @@
               <a:rPr lang="en-US" dirty="0">
                 <a:effectLst/>
               </a:rPr>
-              <a:t>The loader shall be able to detect executables</a:t>
-            </a:r>
+              <a:t>The loader shall be able to </a:t>
+            </a:r>
+            <a:r>
+              <a:rPr lang="en-US" dirty="0">
+                <a:solidFill>
+                  <a:schemeClr val="accent6">
+                    <a:lumMod val="50000"/>
+                  </a:schemeClr>
+                </a:solidFill>
+                <a:effectLst/>
+              </a:rPr>
+              <a:t>detect executables </a:t>
+            </a:r>
+            <a:r>
+              <a:rPr lang="en-US" dirty="0">
+                <a:effectLst/>
+              </a:rPr>
+              <a:t>and run them </a:t>
+            </a:r>
+            <a:r>
+              <a:rPr lang="en-US" dirty="0">
+                <a:solidFill>
+                  <a:schemeClr val="accent6">
+                    <a:lumMod val="50000"/>
+                  </a:schemeClr>
+                </a:solidFill>
+                <a:effectLst/>
+              </a:rPr>
+              <a:t>in memory </a:t>
+            </a:r>
+            <a:r>
+              <a:rPr lang="en-US" dirty="0">
+                <a:effectLst/>
+              </a:rPr>
+              <a:t>as a </a:t>
+            </a:r>
+            <a:r>
+              <a:rPr lang="en-US" dirty="0">
+                <a:solidFill>
+                  <a:schemeClr val="accent6">
+                    <a:lumMod val="50000"/>
+                  </a:schemeClr>
+                </a:solidFill>
+                <a:effectLst/>
+              </a:rPr>
+              <a:t>separate thread/process</a:t>
+            </a:r>
+            <a:r>
+              <a:rPr lang="en-US" dirty="0">
+                <a:effectLst/>
+              </a:rPr>
+              <a:t>; toggles between autorun</a:t>
+            </a:r>
+            <a:endParaRPr lang="en-US" dirty="0">
+              <a:solidFill>
+                <a:schemeClr val="accent6">
+                  <a:lumMod val="50000"/>
+                </a:schemeClr>
+              </a:solidFill>
+              <a:effectLst/>
+            </a:endParaRPr>
           </a:p>
           <a:p>
             <a:pPr lvl="0"/>
@@ -9508,7 +10097,24 @@
               <a:rPr lang="en-US" dirty="0">
                 <a:effectLst/>
               </a:rPr>
-              <a:t>The loader shall be able to run these in memory as a separate thread/process</a:t>
+              <a:t>The packer and loader shall </a:t>
+            </a:r>
+            <a:r>
+              <a:rPr lang="en-US" dirty="0">
+                <a:solidFill>
+                  <a:schemeClr val="accent6">
+                    <a:lumMod val="50000"/>
+                  </a:schemeClr>
+                </a:solidFill>
+                <a:effectLst/>
+              </a:rPr>
+              <a:t>support PE format </a:t>
+            </a:r>
+            <a:r>
+              <a:rPr lang="en-US" dirty="0">
+                <a:effectLst/>
+              </a:rPr>
+              <a:t>(with PE32+, ELF, Mach-O desired)</a:t>
             </a:r>
           </a:p>
           <a:p>
@@ -9517,25 +10123,35 @@
               <a:rPr lang="en-US" dirty="0">
                 <a:effectLst/>
               </a:rPr>
-              <a:t>The loader shall toggle between an automatic run and a prompt during decryption/decompression</a:t>
-            </a:r>
-          </a:p>
-          <a:p>
-            <a:pPr lvl="0"/>
+              <a:t>The encryption shall be </a:t>
+            </a:r>
             <a:r>
               <a:rPr lang="en-US" dirty="0">
-                <a:effectLst/>
-              </a:rPr>
-              <a:t>The packer and loader shall support PE format (with PE32+, ELF, Mach-O desired)</a:t>
-            </a:r>
-          </a:p>
-          <a:p>
-            <a:pPr lvl="0"/>
+                <a:solidFill>
+                  <a:schemeClr val="accent6">
+                    <a:lumMod val="50000"/>
+                  </a:schemeClr>
+                </a:solidFill>
+                <a:effectLst/>
+              </a:rPr>
+              <a:t>AES-256</a:t>
+            </a:r>
             <a:r>
               <a:rPr lang="en-US" dirty="0">
                 <a:effectLst/>
               </a:rPr>
-              <a:t>The encryption shall be AES-256 and password based</a:t>
+              <a:t> and </a:t>
+            </a:r>
+            <a:r>
+              <a:rPr lang="en-US" dirty="0">
+                <a:solidFill>
+                  <a:schemeClr val="accent6">
+                    <a:lumMod val="50000"/>
+                  </a:schemeClr>
+                </a:solidFill>
+                <a:effectLst/>
+              </a:rPr>
+              <a:t>password-based</a:t>
             </a:r>
           </a:p>
           <a:p>

</xml_diff>

<commit_message>
Added Final Design Review
Also added weekly activity report
</commit_message>
<xml_diff>
--- a/Assignments/E04 - Draft Design Review.pptx
+++ b/Assignments/E04 - Draft Design Review.pptx
@@ -346,7 +346,7 @@
           <a:p>
             <a:fld id="{88D38747-4367-4BD2-8D51-C97E202738E2}" type="datetime1">
               <a:rPr lang="en-US" smtClean="0"/>
-              <a:t>11/8/2019</a:t>
+              <a:t>11/30/2019</a:t>
             </a:fld>
             <a:endParaRPr lang="en-US" dirty="0"/>
           </a:p>
@@ -651,7 +651,7 @@
           <a:p>
             <a:fld id="{11F1B079-7EF0-44EE-B798-BCC497C9F3B2}" type="datetime1">
               <a:rPr lang="en-US" smtClean="0"/>
-              <a:t>11/8/2019</a:t>
+              <a:t>11/30/2019</a:t>
             </a:fld>
             <a:endParaRPr lang="en-US" dirty="0"/>
           </a:p>
@@ -845,7 +845,7 @@
           <a:p>
             <a:fld id="{28FF70A8-1D13-4657-95F0-A9EA54967B8D}" type="datetime1">
               <a:rPr lang="en-US" smtClean="0"/>
-              <a:t>11/8/2019</a:t>
+              <a:t>11/30/2019</a:t>
             </a:fld>
             <a:endParaRPr lang="en-US" dirty="0"/>
           </a:p>
@@ -1108,7 +1108,7 @@
           <a:p>
             <a:fld id="{21EB90AC-71BD-4C7F-8ACA-7B3F18292E63}" type="datetime1">
               <a:rPr lang="en-US" smtClean="0"/>
-              <a:t>11/8/2019</a:t>
+              <a:t>11/30/2019</a:t>
             </a:fld>
             <a:endParaRPr lang="en-US" dirty="0"/>
           </a:p>
@@ -1544,7 +1544,7 @@
           <a:p>
             <a:fld id="{4E6EFC2C-8905-46F0-B443-CE905B76BA01}" type="datetime1">
               <a:rPr lang="en-US" smtClean="0"/>
-              <a:t>11/8/2019</a:t>
+              <a:t>11/30/2019</a:t>
             </a:fld>
             <a:endParaRPr lang="en-US" dirty="0"/>
           </a:p>
@@ -2081,7 +2081,7 @@
           <a:p>
             <a:fld id="{D9079DC3-C9B5-499E-9140-0DC28B7074E2}" type="datetime1">
               <a:rPr lang="en-US" smtClean="0"/>
-              <a:t>11/8/2019</a:t>
+              <a:t>11/30/2019</a:t>
             </a:fld>
             <a:endParaRPr lang="en-US" dirty="0"/>
           </a:p>
@@ -2963,7 +2963,7 @@
           <a:p>
             <a:fld id="{30BB33EA-E472-4D22-9C03-A9C14AA21CED}" type="datetime1">
               <a:rPr lang="en-US" smtClean="0"/>
-              <a:t>11/8/2019</a:t>
+              <a:t>11/30/2019</a:t>
             </a:fld>
             <a:endParaRPr lang="en-US" dirty="0"/>
           </a:p>
@@ -3133,7 +3133,7 @@
           <a:p>
             <a:fld id="{217E833E-1B6D-415F-AD29-75AE8C43BD0D}" type="datetime1">
               <a:rPr lang="en-US" smtClean="0"/>
-              <a:t>11/8/2019</a:t>
+              <a:t>11/30/2019</a:t>
             </a:fld>
             <a:endParaRPr lang="en-US" dirty="0"/>
           </a:p>
@@ -3317,7 +3317,7 @@
           <a:p>
             <a:fld id="{8452596F-08A7-4B70-989A-F2B1CF31E66B}" type="datetime1">
               <a:rPr lang="en-US" smtClean="0"/>
-              <a:t>11/8/2019</a:t>
+              <a:t>11/30/2019</a:t>
             </a:fld>
             <a:endParaRPr lang="en-US" dirty="0"/>
           </a:p>
@@ -3487,7 +3487,7 @@
           <a:p>
             <a:fld id="{73C55A3C-5767-4844-A0A3-83778C2E5409}" type="datetime1">
               <a:rPr lang="en-US" smtClean="0"/>
-              <a:t>11/8/2019</a:t>
+              <a:t>11/30/2019</a:t>
             </a:fld>
             <a:endParaRPr lang="en-US" dirty="0"/>
           </a:p>
@@ -3731,7 +3731,7 @@
           <a:p>
             <a:fld id="{CAE507A8-A5CF-4D38-AB86-7EDDA87A85D4}" type="datetime1">
               <a:rPr lang="en-US" smtClean="0"/>
-              <a:t>11/8/2019</a:t>
+              <a:t>11/30/2019</a:t>
             </a:fld>
             <a:endParaRPr lang="en-US" dirty="0"/>
           </a:p>
@@ -3973,7 +3973,7 @@
           <a:p>
             <a:fld id="{BDFCD27C-8599-43EF-BA1D-14DDC1946E06}" type="datetime1">
               <a:rPr lang="en-US" smtClean="0"/>
-              <a:t>11/8/2019</a:t>
+              <a:t>11/30/2019</a:t>
             </a:fld>
             <a:endParaRPr lang="en-US" dirty="0"/>
           </a:p>
@@ -4454,7 +4454,7 @@
           <a:p>
             <a:fld id="{49343D99-809A-49C0-96E5-4250D0B498EE}" type="datetime1">
               <a:rPr lang="en-US" smtClean="0"/>
-              <a:t>11/8/2019</a:t>
+              <a:t>11/30/2019</a:t>
             </a:fld>
             <a:endParaRPr lang="en-US" dirty="0"/>
           </a:p>
@@ -4572,7 +4572,7 @@
           <a:p>
             <a:fld id="{A143DE9B-B678-4EFB-BB7D-A4370204A0B0}" type="datetime1">
               <a:rPr lang="en-US" smtClean="0"/>
-              <a:t>11/8/2019</a:t>
+              <a:t>11/30/2019</a:t>
             </a:fld>
             <a:endParaRPr lang="en-US" dirty="0"/>
           </a:p>
@@ -4667,7 +4667,7 @@
           <a:p>
             <a:fld id="{E68812DA-F765-4142-A6A3-A8ED7235E082}" type="datetime1">
               <a:rPr lang="en-US" smtClean="0"/>
-              <a:t>11/8/2019</a:t>
+              <a:t>11/30/2019</a:t>
             </a:fld>
             <a:endParaRPr lang="en-US" dirty="0"/>
           </a:p>
@@ -4922,7 +4922,7 @@
           <a:p>
             <a:fld id="{3E0277FD-7DE6-41D4-930D-AC99F5AFE54E}" type="datetime1">
               <a:rPr lang="en-US" smtClean="0"/>
-              <a:t>11/8/2019</a:t>
+              <a:t>11/30/2019</a:t>
             </a:fld>
             <a:endParaRPr lang="en-US" dirty="0"/>
           </a:p>
@@ -5229,7 +5229,7 @@
           <a:p>
             <a:fld id="{9EA15526-7079-4B7B-987C-1B5FAE11A0FF}" type="datetime1">
               <a:rPr lang="en-US" smtClean="0"/>
-              <a:t>11/8/2019</a:t>
+              <a:t>11/30/2019</a:t>
             </a:fld>
             <a:endParaRPr lang="en-US" dirty="0"/>
           </a:p>
@@ -5464,7 +5464,7 @@
           <a:p>
             <a:fld id="{073ED0CC-082F-4160-86E5-0D6041F12778}" type="datetime1">
               <a:rPr lang="en-US" smtClean="0"/>
-              <a:t>11/8/2019</a:t>
+              <a:t>11/30/2019</a:t>
             </a:fld>
             <a:endParaRPr lang="en-US" dirty="0"/>
           </a:p>
@@ -6375,7 +6375,7 @@
           </a:effectLst>
           <a:extLst>
             <a:ext uri="{91240B29-F687-4f45-9708-019B960494DF}">
-              <a14:hiddenLine xmlns="" xmlns:a14="http://schemas.microsoft.com/office/drawing/2010/main" xmlns:p14="http://schemas.microsoft.com/office/powerpoint/2010/main" xmlns:a16="http://schemas.microsoft.com/office/drawing/2014/main" w="9525">
+              <a14:hiddenLine xmlns:a16="http://schemas.microsoft.com/office/drawing/2014/main" xmlns:p14="http://schemas.microsoft.com/office/powerpoint/2010/main" xmlns:a14="http://schemas.microsoft.com/office/drawing/2010/main" xmlns="" w="9525">
                 <a:solidFill>
                   <a:srgbClr val="000000"/>
                 </a:solidFill>
@@ -10376,77 +10376,77 @@
           <a:p>
             <a:pPr lvl="0"/>
             <a:r>
-              <a:rPr lang="en-US">
+              <a:rPr lang="en-US" dirty="0">
                 <a:effectLst/>
               </a:rPr>
               <a:t>Our combined knowledge and skillsets </a:t>
             </a:r>
-            <a:endParaRPr lang="en-US" sz="1800">
+            <a:endParaRPr lang="en-US" sz="1800" dirty="0">
               <a:effectLst/>
             </a:endParaRPr>
           </a:p>
           <a:p>
             <a:pPr lvl="1"/>
             <a:r>
-              <a:rPr lang="en-US">
+              <a:rPr lang="en-US" dirty="0">
                 <a:effectLst/>
               </a:rPr>
               <a:t>While the team has extensive experience in software development, some of the particulars of creating a packer and loader combined with network file distribution are outside of members’ area of expertise. </a:t>
             </a:r>
-            <a:endParaRPr lang="en-US" sz="1600">
+            <a:endParaRPr lang="en-US" sz="1600" dirty="0">
               <a:effectLst/>
             </a:endParaRPr>
           </a:p>
           <a:p>
             <a:pPr lvl="0"/>
             <a:r>
-              <a:rPr lang="en-US">
+              <a:rPr lang="en-US" dirty="0">
                 <a:effectLst/>
               </a:rPr>
               <a:t>Limited to open source software </a:t>
             </a:r>
-            <a:endParaRPr lang="en-US" sz="1800">
+            <a:endParaRPr lang="en-US" sz="1800" dirty="0">
               <a:effectLst/>
             </a:endParaRPr>
           </a:p>
           <a:p>
             <a:pPr lvl="1"/>
             <a:r>
-              <a:rPr lang="en-US">
+              <a:rPr lang="en-US" dirty="0">
                 <a:effectLst/>
               </a:rPr>
               <a:t>Without adding a budget to the project to purchase expensive proprietary software, the team can only use free open source software. Additionally, with free closed source software, the team would be unable to determine its inner workings and as such would be unable to guarantee the software does what it claims to do. Similarly, the team would be unable to guarantee that the software only does what it claims to do. </a:t>
             </a:r>
-            <a:endParaRPr lang="en-US" sz="1600">
+            <a:endParaRPr lang="en-US" sz="1600" dirty="0">
               <a:effectLst/>
             </a:endParaRPr>
           </a:p>
           <a:p>
             <a:pPr lvl="0"/>
             <a:r>
-              <a:rPr lang="en-US">
+              <a:rPr lang="en-US" dirty="0">
                 <a:effectLst/>
               </a:rPr>
               <a:t>Time allocated to the project </a:t>
             </a:r>
-            <a:endParaRPr lang="en-US" sz="1800">
+            <a:endParaRPr lang="en-US" sz="1800" dirty="0">
               <a:effectLst/>
             </a:endParaRPr>
           </a:p>
           <a:p>
             <a:pPr lvl="1"/>
             <a:r>
-              <a:rPr lang="en-US">
+              <a:rPr lang="en-US" dirty="0">
                 <a:effectLst/>
               </a:rPr>
               <a:t>With the hard time constraints imposed by completing this project as a senior capstone, any requirements needing more time than the two combined semesters will be impossible to complete. </a:t>
             </a:r>
-            <a:endParaRPr lang="en-US" sz="1600">
+            <a:endParaRPr lang="en-US" sz="1600" dirty="0">
               <a:effectLst/>
             </a:endParaRPr>
           </a:p>
           <a:p>
-            <a:endParaRPr lang="en-US"/>
+            <a:endParaRPr lang="en-US" dirty="0"/>
           </a:p>
         </p:txBody>
       </p:sp>

</xml_diff>